<commit_message>
Update Team Meeting 14Sep17
Highlighted recommendations from Dr. Huber
</commit_message>
<xml_diff>
--- a/Team Meeting 14Sep17.pptx
+++ b/Team Meeting 14Sep17.pptx
@@ -7,14 +7,14 @@
   <p:sldIdLst>
     <p:sldId id="259" r:id="rId2"/>
     <p:sldId id="260" r:id="rId3"/>
-    <p:sldId id="267" r:id="rId4"/>
-    <p:sldId id="269" r:id="rId5"/>
-    <p:sldId id="263" r:id="rId6"/>
-    <p:sldId id="264" r:id="rId7"/>
-    <p:sldId id="265" r:id="rId8"/>
-    <p:sldId id="266" r:id="rId9"/>
-    <p:sldId id="261" r:id="rId10"/>
-    <p:sldId id="262" r:id="rId11"/>
+    <p:sldId id="272" r:id="rId4"/>
+    <p:sldId id="267" r:id="rId5"/>
+    <p:sldId id="269" r:id="rId6"/>
+    <p:sldId id="263" r:id="rId7"/>
+    <p:sldId id="264" r:id="rId8"/>
+    <p:sldId id="265" r:id="rId9"/>
+    <p:sldId id="266" r:id="rId10"/>
+    <p:sldId id="261" r:id="rId11"/>
     <p:sldId id="257" r:id="rId12"/>
     <p:sldId id="270" r:id="rId13"/>
     <p:sldId id="271" r:id="rId14"/>
@@ -300,7 +300,7 @@
           <a:p>
             <a:fld id="{A4D5AEB8-79A1-48D4-BACB-1638CFEAD342}" type="datetimeFigureOut">
               <a:rPr lang="en-US" smtClean="0"/>
-              <a:t>9/14/2017</a:t>
+              <a:t>9/17/2017</a:t>
             </a:fld>
             <a:endParaRPr lang="en-US" dirty="0"/>
           </a:p>
@@ -470,7 +470,7 @@
           <a:p>
             <a:fld id="{A4D5AEB8-79A1-48D4-BACB-1638CFEAD342}" type="datetimeFigureOut">
               <a:rPr lang="en-US" smtClean="0"/>
-              <a:t>9/14/2017</a:t>
+              <a:t>9/17/2017</a:t>
             </a:fld>
             <a:endParaRPr lang="en-US" dirty="0"/>
           </a:p>
@@ -650,7 +650,7 @@
           <a:p>
             <a:fld id="{A4D5AEB8-79A1-48D4-BACB-1638CFEAD342}" type="datetimeFigureOut">
               <a:rPr lang="en-US" smtClean="0"/>
-              <a:t>9/14/2017</a:t>
+              <a:t>9/17/2017</a:t>
             </a:fld>
             <a:endParaRPr lang="en-US" dirty="0"/>
           </a:p>
@@ -820,7 +820,7 @@
           <a:p>
             <a:fld id="{A4D5AEB8-79A1-48D4-BACB-1638CFEAD342}" type="datetimeFigureOut">
               <a:rPr lang="en-US" smtClean="0"/>
-              <a:t>9/14/2017</a:t>
+              <a:t>9/17/2017</a:t>
             </a:fld>
             <a:endParaRPr lang="en-US" dirty="0"/>
           </a:p>
@@ -1066,7 +1066,7 @@
           <a:p>
             <a:fld id="{A4D5AEB8-79A1-48D4-BACB-1638CFEAD342}" type="datetimeFigureOut">
               <a:rPr lang="en-US" smtClean="0"/>
-              <a:t>9/14/2017</a:t>
+              <a:t>9/17/2017</a:t>
             </a:fld>
             <a:endParaRPr lang="en-US" dirty="0"/>
           </a:p>
@@ -1354,7 +1354,7 @@
           <a:p>
             <a:fld id="{A4D5AEB8-79A1-48D4-BACB-1638CFEAD342}" type="datetimeFigureOut">
               <a:rPr lang="en-US" smtClean="0"/>
-              <a:t>9/14/2017</a:t>
+              <a:t>9/17/2017</a:t>
             </a:fld>
             <a:endParaRPr lang="en-US" dirty="0"/>
           </a:p>
@@ -1776,7 +1776,7 @@
           <a:p>
             <a:fld id="{A4D5AEB8-79A1-48D4-BACB-1638CFEAD342}" type="datetimeFigureOut">
               <a:rPr lang="en-US" smtClean="0"/>
-              <a:t>9/14/2017</a:t>
+              <a:t>9/17/2017</a:t>
             </a:fld>
             <a:endParaRPr lang="en-US" dirty="0"/>
           </a:p>
@@ -1894,7 +1894,7 @@
           <a:p>
             <a:fld id="{A4D5AEB8-79A1-48D4-BACB-1638CFEAD342}" type="datetimeFigureOut">
               <a:rPr lang="en-US" smtClean="0"/>
-              <a:t>9/14/2017</a:t>
+              <a:t>9/17/2017</a:t>
             </a:fld>
             <a:endParaRPr lang="en-US" dirty="0"/>
           </a:p>
@@ -1989,7 +1989,7 @@
           <a:p>
             <a:fld id="{A4D5AEB8-79A1-48D4-BACB-1638CFEAD342}" type="datetimeFigureOut">
               <a:rPr lang="en-US" smtClean="0"/>
-              <a:t>9/14/2017</a:t>
+              <a:t>9/17/2017</a:t>
             </a:fld>
             <a:endParaRPr lang="en-US" dirty="0"/>
           </a:p>
@@ -2266,7 +2266,7 @@
           <a:p>
             <a:fld id="{A4D5AEB8-79A1-48D4-BACB-1638CFEAD342}" type="datetimeFigureOut">
               <a:rPr lang="en-US" smtClean="0"/>
-              <a:t>9/14/2017</a:t>
+              <a:t>9/17/2017</a:t>
             </a:fld>
             <a:endParaRPr lang="en-US" dirty="0"/>
           </a:p>
@@ -2519,7 +2519,7 @@
           <a:p>
             <a:fld id="{A4D5AEB8-79A1-48D4-BACB-1638CFEAD342}" type="datetimeFigureOut">
               <a:rPr lang="en-US" smtClean="0"/>
-              <a:t>9/14/2017</a:t>
+              <a:t>9/17/2017</a:t>
             </a:fld>
             <a:endParaRPr lang="en-US" dirty="0"/>
           </a:p>
@@ -2732,7 +2732,7 @@
           <a:p>
             <a:fld id="{A4D5AEB8-79A1-48D4-BACB-1638CFEAD342}" type="datetimeFigureOut">
               <a:rPr lang="en-US" smtClean="0"/>
-              <a:t>9/14/2017</a:t>
+              <a:t>9/17/2017</a:t>
             </a:fld>
             <a:endParaRPr lang="en-US" dirty="0"/>
           </a:p>
@@ -3197,15 +3197,7 @@
             </a:pPr>
             <a:r>
               <a:rPr lang="en-US" sz="3200" dirty="0" smtClean="0"/>
-              <a:t>User </a:t>
-            </a:r>
-            <a:r>
-              <a:rPr lang="en-US" sz="3200" dirty="0" smtClean="0"/>
-              <a:t>Requirements/Security </a:t>
-            </a:r>
-            <a:r>
-              <a:rPr lang="en-US" sz="3200" dirty="0" smtClean="0"/>
-              <a:t>Remediation Plan</a:t>
+              <a:t>User Requirements/Security Remediation Plan</a:t>
             </a:r>
           </a:p>
           <a:p>
@@ -3287,31 +3279,7 @@
                   <a:srgbClr val="FF0000"/>
                 </a:solidFill>
               </a:rPr>
-              <a:t>Due </a:t>
-            </a:r>
-            <a:r>
-              <a:rPr lang="en-US" sz="3200" b="1" dirty="0" smtClean="0">
-                <a:solidFill>
-                  <a:srgbClr val="FF0000"/>
-                </a:solidFill>
-              </a:rPr>
-              <a:t>date</a:t>
-            </a:r>
-            <a:r>
-              <a:rPr lang="en-US" sz="3200" b="1" dirty="0" smtClean="0">
-                <a:solidFill>
-                  <a:srgbClr val="FF0000"/>
-                </a:solidFill>
-              </a:rPr>
-              <a:t> </a:t>
-            </a:r>
-            <a:r>
-              <a:rPr lang="en-US" sz="3200" b="1" dirty="0" smtClean="0">
-                <a:solidFill>
-                  <a:srgbClr val="FF0000"/>
-                </a:solidFill>
-              </a:rPr>
-              <a:t>TBD</a:t>
+              <a:t>Due date TBD</a:t>
             </a:r>
           </a:p>
         </p:txBody>
@@ -3355,7 +3323,7 @@
       </p:grpSpPr>
       <p:sp>
         <p:nvSpPr>
-          <p:cNvPr id="2" name="Title 1"/>
+          <p:cNvPr id="4" name="Title 1"/>
           <p:cNvSpPr txBox="1">
             <a:spLocks/>
           </p:cNvSpPr>
@@ -3363,7 +3331,7 @@
         </p:nvSpPr>
         <p:spPr>
           <a:xfrm>
-            <a:off x="457200" y="274638"/>
+            <a:off x="457200" y="2667000"/>
             <a:ext cx="8229600" cy="1143000"/>
           </a:xfrm>
           <a:prstGeom prst="rect">
@@ -3392,152 +3360,17 @@
           </a:lstStyle>
           <a:p>
             <a:r>
-              <a:rPr lang="en-US" b="1" dirty="0" smtClean="0"/>
-              <a:t>Dr. Huber’s Recommendation</a:t>
-            </a:r>
-            <a:endParaRPr lang="en-US" b="1" dirty="0"/>
-          </a:p>
-        </p:txBody>
-      </p:sp>
-      <p:sp>
-        <p:nvSpPr>
-          <p:cNvPr id="3" name="TextBox 2"/>
-          <p:cNvSpPr txBox="1"/>
-          <p:nvPr/>
-        </p:nvSpPr>
-        <p:spPr>
-          <a:xfrm>
-            <a:off x="228600" y="1371600"/>
-            <a:ext cx="8763000" cy="5262979"/>
-          </a:xfrm>
-          <a:prstGeom prst="rect">
-            <a:avLst/>
-          </a:prstGeom>
-          <a:noFill/>
-        </p:spPr>
-        <p:txBody>
-          <a:bodyPr wrap="square" rtlCol="0">
-            <a:spAutoFit/>
-          </a:bodyPr>
-          <a:lstStyle/>
-          <a:p>
-            <a:pPr marL="287338" indent="-287338">
-              <a:buFont typeface="Arial" panose="020B0604020202020204" pitchFamily="34" charset="0"/>
-              <a:buChar char="•"/>
-            </a:pPr>
-            <a:r>
-              <a:rPr lang="en-US" sz="2800" dirty="0" smtClean="0"/>
-              <a:t>This </a:t>
-            </a:r>
-            <a:r>
-              <a:rPr lang="en-US" sz="2800" dirty="0"/>
-              <a:t>project will be more of a </a:t>
-            </a:r>
-            <a:r>
-              <a:rPr lang="en-US" sz="2800" b="1" dirty="0"/>
-              <a:t>rebuild and enhance </a:t>
-            </a:r>
-            <a:r>
-              <a:rPr lang="en-US" sz="2800" dirty="0"/>
-              <a:t>than a reinvent the wheel</a:t>
-            </a:r>
-          </a:p>
-          <a:p>
-            <a:pPr marL="287338" indent="-287338">
-              <a:buFont typeface="Arial" panose="020B0604020202020204" pitchFamily="34" charset="0"/>
-              <a:buChar char="•"/>
-            </a:pPr>
-            <a:r>
-              <a:rPr lang="en-US" sz="2800" dirty="0" smtClean="0"/>
-              <a:t>However</a:t>
-            </a:r>
-            <a:r>
-              <a:rPr lang="en-US" sz="2800" dirty="0"/>
-              <a:t>, the analysis and your team’s recommendations will also be a major deliverable for </a:t>
-            </a:r>
-            <a:r>
-              <a:rPr lang="en-US" sz="2800" dirty="0" smtClean="0"/>
-              <a:t>Fall</a:t>
-            </a:r>
-          </a:p>
-          <a:p>
-            <a:pPr marL="287338" indent="-287338">
-              <a:buFont typeface="Arial" panose="020B0604020202020204" pitchFamily="34" charset="0"/>
-              <a:buChar char="•"/>
-            </a:pPr>
-            <a:r>
-              <a:rPr lang="en-US" sz="2800" b="1" dirty="0" smtClean="0"/>
-              <a:t>Look </a:t>
-            </a:r>
-            <a:r>
-              <a:rPr lang="en-US" sz="2800" b="1" dirty="0"/>
-              <a:t>at the existing website and extract what you think are the initial requirements of the Friends </a:t>
-            </a:r>
-            <a:r>
-              <a:rPr lang="en-US" sz="2800" b="1" dirty="0" smtClean="0"/>
-              <a:t>Chapter</a:t>
-            </a:r>
-          </a:p>
-          <a:p>
-            <a:pPr marL="287338" indent="-287338">
-              <a:buFont typeface="Arial" panose="020B0604020202020204" pitchFamily="34" charset="0"/>
-              <a:buChar char="•"/>
-            </a:pPr>
-            <a:r>
-              <a:rPr lang="en-US" sz="2800" dirty="0" smtClean="0"/>
-              <a:t>This </a:t>
-            </a:r>
-            <a:r>
-              <a:rPr lang="en-US" sz="2800" dirty="0"/>
-              <a:t>will also give you an idea of the feature set and </a:t>
-            </a:r>
-            <a:r>
-              <a:rPr lang="en-US" sz="2800" dirty="0" smtClean="0"/>
-              <a:t>UI/UX</a:t>
-            </a:r>
-          </a:p>
-          <a:p>
-            <a:pPr marL="287338" indent="-287338">
-              <a:buFont typeface="Arial" panose="020B0604020202020204" pitchFamily="34" charset="0"/>
-              <a:buChar char="•"/>
-            </a:pPr>
-            <a:r>
-              <a:rPr lang="en-US" sz="2800" dirty="0" smtClean="0"/>
-              <a:t>Biggest </a:t>
-            </a:r>
-            <a:r>
-              <a:rPr lang="en-US" sz="2800" dirty="0"/>
-              <a:t>complaints about the website were </a:t>
-            </a:r>
-            <a:r>
-              <a:rPr lang="en-US" sz="2800" b="1" dirty="0"/>
-              <a:t>ease of update/maintenance, and </a:t>
-            </a:r>
-            <a:r>
-              <a:rPr lang="en-US" sz="2800" b="1" dirty="0" smtClean="0"/>
-              <a:t>security</a:t>
-            </a:r>
-          </a:p>
-          <a:p>
-            <a:pPr marL="287338" indent="-287338">
-              <a:buFont typeface="Arial" panose="020B0604020202020204" pitchFamily="34" charset="0"/>
-              <a:buChar char="•"/>
-            </a:pPr>
-            <a:r>
-              <a:rPr lang="en-US" sz="2800" dirty="0" smtClean="0"/>
-              <a:t>Use </a:t>
-            </a:r>
-            <a:r>
-              <a:rPr lang="en-US" sz="2800" dirty="0"/>
-              <a:t>the feature set you discover to create a starting point for the conversation with the sponsor.</a:t>
-            </a:r>
+              <a:rPr lang="en-US" sz="6000" b="1" dirty="0" smtClean="0"/>
+              <a:t>BACKUPS</a:t>
+            </a:r>
+            <a:endParaRPr lang="en-US" sz="6000" b="1" dirty="0"/>
           </a:p>
         </p:txBody>
       </p:sp>
     </p:spTree>
     <p:extLst>
       <p:ext uri="{BB962C8B-B14F-4D97-AF65-F5344CB8AC3E}">
-        <p14:creationId xmlns:p14="http://schemas.microsoft.com/office/powerpoint/2010/main" val="3331161136"/>
+        <p14:creationId xmlns:p14="http://schemas.microsoft.com/office/powerpoint/2010/main" val="763363549"/>
       </p:ext>
     </p:extLst>
   </p:cSld>
@@ -4121,8 +3954,8 @@
         </p:nvSpPr>
         <p:spPr>
           <a:xfrm>
-            <a:off x="838200" y="274638"/>
-            <a:ext cx="7391400" cy="1143000"/>
+            <a:off x="457200" y="274638"/>
+            <a:ext cx="8229600" cy="1143000"/>
           </a:xfrm>
           <a:prstGeom prst="rect">
             <a:avLst/>
@@ -4130,7 +3963,7 @@
         </p:spPr>
         <p:txBody>
           <a:bodyPr vert="horz" lIns="91440" tIns="45720" rIns="91440" bIns="45720" rtlCol="0" anchor="ctr">
-            <a:noAutofit/>
+            <a:normAutofit/>
           </a:bodyPr>
           <a:lstStyle>
             <a:lvl1pPr algn="ctr" defTabSz="914400" rtl="0" eaLnBrk="1" latinLnBrk="0" hangingPunct="1">
@@ -4149,15 +3982,11 @@
             </a:lvl1pPr>
           </a:lstStyle>
           <a:p>
-            <a:pPr marL="223837" lvl="1" algn="ctr">
-              <a:spcBef>
-                <a:spcPts val="600"/>
-              </a:spcBef>
-            </a:pPr>
-            <a:r>
-              <a:rPr lang="en-US" sz="4000" b="1" dirty="0"/>
-              <a:t>User Requirements / Security Remediation Plan</a:t>
-            </a:r>
+            <a:r>
+              <a:rPr lang="en-US" b="1" dirty="0" smtClean="0"/>
+              <a:t>Dr. Huber’s Recommendation</a:t>
+            </a:r>
+            <a:endParaRPr lang="en-US" b="1" dirty="0"/>
           </a:p>
         </p:txBody>
       </p:sp>
@@ -4169,8 +3998,8 @@
         </p:nvSpPr>
         <p:spPr>
           <a:xfrm>
-            <a:off x="457200" y="1769507"/>
-            <a:ext cx="8305800" cy="4555093"/>
+            <a:off x="228600" y="1371600"/>
+            <a:ext cx="8763000" cy="5262979"/>
           </a:xfrm>
           <a:prstGeom prst="rect">
             <a:avLst/>
@@ -4184,108 +4013,138 @@
           <a:lstStyle/>
           <a:p>
             <a:pPr marL="287338" indent="-287338">
-              <a:spcBef>
-                <a:spcPts val="600"/>
-              </a:spcBef>
               <a:buFont typeface="Arial" panose="020B0604020202020204" pitchFamily="34" charset="0"/>
               <a:buChar char="•"/>
             </a:pPr>
             <a:r>
-              <a:rPr lang="en-US" sz="3000" dirty="0" smtClean="0"/>
-              <a:t>Ensure website is free of any </a:t>
-            </a:r>
-            <a:r>
-              <a:rPr lang="en-US" sz="3000" dirty="0" smtClean="0">
-                <a:hlinkClick r:id="rId2" action="ppaction://hlinkfile"/>
+              <a:rPr lang="en-US" sz="2800" dirty="0" smtClean="0"/>
+              <a:t>This </a:t>
+            </a:r>
+            <a:r>
+              <a:rPr lang="en-US" sz="2800" dirty="0"/>
+              <a:t>project will be more of a </a:t>
+            </a:r>
+            <a:r>
+              <a:rPr lang="en-US" sz="2800" b="1" dirty="0">
+                <a:solidFill>
+                  <a:srgbClr val="FF0000"/>
+                </a:solidFill>
               </a:rPr>
-              <a:t>malicious injected codes</a:t>
-            </a:r>
-            <a:endParaRPr lang="en-US" sz="3000" dirty="0" smtClean="0"/>
+              <a:t>rebuild and enhance </a:t>
+            </a:r>
+            <a:r>
+              <a:rPr lang="en-US" sz="2800" dirty="0"/>
+              <a:t>than a reinvent the wheel</a:t>
+            </a:r>
           </a:p>
           <a:p>
             <a:pPr marL="287338" indent="-287338">
-              <a:spcBef>
-                <a:spcPts val="600"/>
-              </a:spcBef>
               <a:buFont typeface="Arial" panose="020B0604020202020204" pitchFamily="34" charset="0"/>
               <a:buChar char="•"/>
             </a:pPr>
             <a:r>
-              <a:rPr lang="en-US" sz="3000" dirty="0" smtClean="0"/>
-              <a:t>Determine which</a:t>
-            </a:r>
-            <a:r>
-              <a:rPr lang="en-US" sz="3000" dirty="0" smtClean="0"/>
-              <a:t> </a:t>
-            </a:r>
-            <a:r>
-              <a:rPr lang="en-US" sz="3000" dirty="0" smtClean="0"/>
-              <a:t>website </a:t>
-            </a:r>
-            <a:r>
-              <a:rPr lang="en-US" sz="3000" dirty="0" smtClean="0"/>
-              <a:t>contents can be reused</a:t>
+              <a:rPr lang="en-US" sz="2800" dirty="0" smtClean="0"/>
+              <a:t>However</a:t>
+            </a:r>
+            <a:r>
+              <a:rPr lang="en-US" sz="2800" dirty="0"/>
+              <a:t>, the analysis and your team’s recommendations will also be a major deliverable for </a:t>
+            </a:r>
+            <a:r>
+              <a:rPr lang="en-US" sz="2800" dirty="0" smtClean="0"/>
+              <a:t>Fall</a:t>
             </a:r>
           </a:p>
           <a:p>
             <a:pPr marL="287338" indent="-287338">
-              <a:spcBef>
-                <a:spcPts val="600"/>
-              </a:spcBef>
               <a:buFont typeface="Arial" panose="020B0604020202020204" pitchFamily="34" charset="0"/>
               <a:buChar char="•"/>
             </a:pPr>
             <a:r>
-              <a:rPr lang="en-US" sz="3000" dirty="0" smtClean="0"/>
-              <a:t>Determine which database tables should be retained or rebuilt</a:t>
-            </a:r>
-            <a:endParaRPr lang="en-US" sz="3000" dirty="0" smtClean="0"/>
+              <a:rPr lang="en-US" sz="2800" b="1" dirty="0" smtClean="0">
+                <a:solidFill>
+                  <a:srgbClr val="FF0000"/>
+                </a:solidFill>
+              </a:rPr>
+              <a:t>Look </a:t>
+            </a:r>
+            <a:r>
+              <a:rPr lang="en-US" sz="2800" b="1" dirty="0">
+                <a:solidFill>
+                  <a:srgbClr val="FF0000"/>
+                </a:solidFill>
+              </a:rPr>
+              <a:t>at the existing website and extract what you think are the initial requirements of the Friends </a:t>
+            </a:r>
+            <a:r>
+              <a:rPr lang="en-US" sz="2800" b="1" dirty="0" smtClean="0">
+                <a:solidFill>
+                  <a:srgbClr val="FF0000"/>
+                </a:solidFill>
+              </a:rPr>
+              <a:t>Chapter</a:t>
+            </a:r>
           </a:p>
           <a:p>
             <a:pPr marL="287338" indent="-287338">
-              <a:spcBef>
-                <a:spcPts val="600"/>
-              </a:spcBef>
               <a:buFont typeface="Arial" panose="020B0604020202020204" pitchFamily="34" charset="0"/>
               <a:buChar char="•"/>
             </a:pPr>
             <a:r>
-              <a:rPr lang="en-US" sz="3000" dirty="0" smtClean="0"/>
-              <a:t>Recommend adding </a:t>
-            </a:r>
-            <a:r>
-              <a:rPr lang="en-US" sz="3000" dirty="0" smtClean="0"/>
-              <a:t>necessary</a:t>
-            </a:r>
-            <a:r>
-              <a:rPr lang="en-US" sz="3000" dirty="0" smtClean="0"/>
-              <a:t> </a:t>
-            </a:r>
-            <a:r>
-              <a:rPr lang="en-US" sz="3000" dirty="0" smtClean="0"/>
-              <a:t>functionalities such as report generator of volunteer </a:t>
-            </a:r>
-            <a:r>
-              <a:rPr lang="en-US" sz="3000" dirty="0" smtClean="0"/>
-              <a:t>hours, state site link, etc.</a:t>
-            </a:r>
-            <a:endParaRPr lang="en-US" sz="3000" dirty="0" smtClean="0"/>
+              <a:rPr lang="en-US" sz="2800" dirty="0" smtClean="0"/>
+              <a:t>This </a:t>
+            </a:r>
+            <a:r>
+              <a:rPr lang="en-US" sz="2800" dirty="0"/>
+              <a:t>will also give you an idea of the feature set and </a:t>
+            </a:r>
+            <a:r>
+              <a:rPr lang="en-US" sz="2800" dirty="0" smtClean="0"/>
+              <a:t>UI/UX</a:t>
+            </a:r>
           </a:p>
           <a:p>
             <a:pPr marL="287338" indent="-287338">
-              <a:spcBef>
-                <a:spcPts val="600"/>
-              </a:spcBef>
               <a:buFont typeface="Arial" panose="020B0604020202020204" pitchFamily="34" charset="0"/>
               <a:buChar char="•"/>
             </a:pPr>
             <a:r>
-              <a:rPr lang="en-US" sz="3000" dirty="0" smtClean="0"/>
-              <a:t>Recommend redesigning site for optimized </a:t>
-            </a:r>
-            <a:r>
-              <a:rPr lang="en-US" sz="3000" dirty="0" smtClean="0"/>
-              <a:t>UX/UI</a:t>
+              <a:rPr lang="en-US" sz="2800" dirty="0" smtClean="0"/>
+              <a:t>Biggest </a:t>
+            </a:r>
+            <a:r>
+              <a:rPr lang="en-US" sz="2800" dirty="0"/>
+              <a:t>complaints about the website were </a:t>
+            </a:r>
+            <a:r>
+              <a:rPr lang="en-US" sz="2800" b="1" dirty="0">
+                <a:solidFill>
+                  <a:srgbClr val="FF0000"/>
+                </a:solidFill>
+              </a:rPr>
+              <a:t>ease of update/maintenance, and </a:t>
+            </a:r>
+            <a:r>
+              <a:rPr lang="en-US" sz="2800" b="1" dirty="0" smtClean="0">
+                <a:solidFill>
+                  <a:srgbClr val="FF0000"/>
+                </a:solidFill>
+              </a:rPr>
+              <a:t>security</a:t>
+            </a:r>
+          </a:p>
+          <a:p>
+            <a:pPr marL="287338" indent="-287338">
+              <a:buFont typeface="Arial" panose="020B0604020202020204" pitchFamily="34" charset="0"/>
+              <a:buChar char="•"/>
+            </a:pPr>
+            <a:r>
+              <a:rPr lang="en-US" sz="2800" dirty="0" smtClean="0"/>
+              <a:t>Use </a:t>
+            </a:r>
+            <a:r>
+              <a:rPr lang="en-US" sz="2800" dirty="0"/>
+              <a:t>the feature set you discover to create a starting point for the conversation with the sponsor.</a:t>
             </a:r>
           </a:p>
         </p:txBody>
@@ -4293,7 +4152,7 @@
     </p:spTree>
     <p:extLst>
       <p:ext uri="{BB962C8B-B14F-4D97-AF65-F5344CB8AC3E}">
-        <p14:creationId xmlns:p14="http://schemas.microsoft.com/office/powerpoint/2010/main" val="350524939"/>
+        <p14:creationId xmlns:p14="http://schemas.microsoft.com/office/powerpoint/2010/main" val="1504016551"/>
       </p:ext>
     </p:extLst>
   </p:cSld>
@@ -4330,249 +4189,152 @@
       <p:sp>
         <p:nvSpPr>
           <p:cNvPr id="2" name="Title 1"/>
-          <p:cNvSpPr>
-            <a:spLocks noGrp="1"/>
-          </p:cNvSpPr>
-          <p:nvPr>
-            <p:ph type="title"/>
-          </p:nvPr>
+          <p:cNvSpPr txBox="1">
+            <a:spLocks/>
+          </p:cNvSpPr>
+          <p:nvPr/>
         </p:nvSpPr>
         <p:spPr>
           <a:xfrm>
-            <a:off x="457200" y="152400"/>
-            <a:ext cx="8229600" cy="838200"/>
+            <a:off x="838200" y="274638"/>
+            <a:ext cx="7391400" cy="1143000"/>
           </a:xfrm>
+          <a:prstGeom prst="rect">
+            <a:avLst/>
+          </a:prstGeom>
         </p:spPr>
         <p:txBody>
-          <a:bodyPr/>
-          <a:lstStyle/>
-          <a:p>
-            <a:pPr marL="223837" marR="0" lvl="1" indent="0" algn="ctr" defTabSz="914400" rtl="0" eaLnBrk="1" fontAlgn="auto" latinLnBrk="0" hangingPunct="1">
-              <a:lnSpc>
-                <a:spcPct val="100000"/>
-              </a:lnSpc>
+          <a:bodyPr vert="horz" lIns="91440" tIns="45720" rIns="91440" bIns="45720" rtlCol="0" anchor="ctr">
+            <a:noAutofit/>
+          </a:bodyPr>
+          <a:lstStyle>
+            <a:lvl1pPr algn="ctr" defTabSz="914400" rtl="0" eaLnBrk="1" latinLnBrk="0" hangingPunct="1">
               <a:spcBef>
-                <a:spcPts val="600"/>
+                <a:spcPct val="0"/>
               </a:spcBef>
-              <a:spcAft>
-                <a:spcPts val="0"/>
-              </a:spcAft>
-              <a:tabLst/>
-              <a:defRPr/>
-            </a:pPr>
-            <a:r>
-              <a:rPr kumimoji="0" lang="en-US" sz="4800" b="1" i="0" u="none" strike="noStrike" kern="1200" cap="none" spc="0" normalizeH="0" baseline="0" noProof="0" dirty="0" smtClean="0">
-                <a:ln>
-                  <a:noFill/>
-                </a:ln>
+              <a:buNone/>
+              <a:defRPr sz="4400" kern="1200">
                 <a:solidFill>
-                  <a:prstClr val="black"/>
+                  <a:schemeClr val="tx1"/>
                 </a:solidFill>
-                <a:effectLst/>
-                <a:uLnTx/>
-                <a:uFillTx/>
-                <a:latin typeface="Calibri"/>
-                <a:ea typeface="+mn-ea"/>
-                <a:cs typeface="+mn-cs"/>
-              </a:rPr>
-              <a:t>User Requirements</a:t>
-            </a:r>
-            <a:endParaRPr lang="en-US" dirty="0"/>
-          </a:p>
-        </p:txBody>
-      </p:sp>
-      <p:sp>
-        <p:nvSpPr>
-          <p:cNvPr id="3" name="Content Placeholder 2"/>
-          <p:cNvSpPr>
-            <a:spLocks noGrp="1"/>
-          </p:cNvSpPr>
-          <p:nvPr>
-            <p:ph idx="1"/>
-          </p:nvPr>
-        </p:nvSpPr>
-        <p:spPr>
-          <a:xfrm>
-            <a:off x="457200" y="990600"/>
-            <a:ext cx="8229600" cy="5867400"/>
-          </a:xfrm>
-        </p:spPr>
-        <p:txBody>
-          <a:bodyPr>
-            <a:normAutofit fontScale="85000" lnSpcReduction="20000"/>
-          </a:bodyPr>
-          <a:lstStyle/>
-          <a:p>
-            <a:pPr>
-              <a:lnSpc>
-                <a:spcPct val="120000"/>
-              </a:lnSpc>
+                <a:latin typeface="+mj-lt"/>
+                <a:ea typeface="+mj-ea"/>
+                <a:cs typeface="+mj-cs"/>
+              </a:defRPr>
+            </a:lvl1pPr>
+          </a:lstStyle>
+          <a:p>
+            <a:pPr marL="223837" lvl="1" algn="ctr">
               <a:spcBef>
                 <a:spcPts val="600"/>
               </a:spcBef>
             </a:pPr>
             <a:r>
-              <a:rPr lang="en-US" sz="3500" dirty="0"/>
-              <a:t>Gather potential user requirements from team </a:t>
-            </a:r>
-            <a:r>
-              <a:rPr lang="en-US" sz="3500" dirty="0" smtClean="0"/>
-              <a:t>members</a:t>
-            </a:r>
-          </a:p>
-          <a:p>
-            <a:pPr lvl="1">
-              <a:lnSpc>
-                <a:spcPct val="120000"/>
-              </a:lnSpc>
+              <a:rPr lang="en-US" sz="4000" b="1" dirty="0"/>
+              <a:t>User Requirements / Security Remediation Plan</a:t>
+            </a:r>
+          </a:p>
+        </p:txBody>
+      </p:sp>
+      <p:sp>
+        <p:nvSpPr>
+          <p:cNvPr id="3" name="TextBox 2"/>
+          <p:cNvSpPr txBox="1"/>
+          <p:nvPr/>
+        </p:nvSpPr>
+        <p:spPr>
+          <a:xfrm>
+            <a:off x="457200" y="1769507"/>
+            <a:ext cx="8305800" cy="4555093"/>
+          </a:xfrm>
+          <a:prstGeom prst="rect">
+            <a:avLst/>
+          </a:prstGeom>
+          <a:noFill/>
+        </p:spPr>
+        <p:txBody>
+          <a:bodyPr wrap="square" rtlCol="0">
+            <a:spAutoFit/>
+          </a:bodyPr>
+          <a:lstStyle/>
+          <a:p>
+            <a:pPr marL="287338" indent="-287338">
               <a:spcBef>
                 <a:spcPts val="600"/>
               </a:spcBef>
+              <a:buFont typeface="Arial" panose="020B0604020202020204" pitchFamily="34" charset="0"/>
+              <a:buChar char="•"/>
             </a:pPr>
             <a:r>
               <a:rPr lang="en-US" sz="3000" dirty="0" smtClean="0"/>
-              <a:t>Website Pages (Home, About Us, Activities, Volunteer Opportunities, Contact Us, and Friends Chapter)</a:t>
-            </a:r>
-          </a:p>
-          <a:p>
-            <a:pPr lvl="1">
-              <a:lnSpc>
-                <a:spcPct val="120000"/>
-              </a:lnSpc>
+              <a:t>Ensure website is free of any </a:t>
+            </a:r>
+            <a:r>
+              <a:rPr lang="en-US" sz="3000" dirty="0" smtClean="0">
+                <a:hlinkClick r:id="rId2" action="ppaction://hlinkfile"/>
+              </a:rPr>
+              <a:t>malicious injected codes</a:t>
+            </a:r>
+            <a:endParaRPr lang="en-US" sz="3000" dirty="0" smtClean="0"/>
+          </a:p>
+          <a:p>
+            <a:pPr marL="287338" indent="-287338">
               <a:spcBef>
                 <a:spcPts val="600"/>
               </a:spcBef>
+              <a:buFont typeface="Arial" panose="020B0604020202020204" pitchFamily="34" charset="0"/>
+              <a:buChar char="•"/>
             </a:pPr>
             <a:r>
-              <a:rPr lang="en-US" sz="3000" dirty="0"/>
-              <a:t>Become a Friend or </a:t>
-            </a:r>
-            <a:r>
               <a:rPr lang="en-US" sz="3000" dirty="0" smtClean="0"/>
-              <a:t>Volunteer Page</a:t>
-            </a:r>
-          </a:p>
-          <a:p>
-            <a:pPr lvl="1">
-              <a:lnSpc>
-                <a:spcPct val="120000"/>
-              </a:lnSpc>
+              <a:t>Determine which website contents can be reused</a:t>
+            </a:r>
+          </a:p>
+          <a:p>
+            <a:pPr marL="287338" indent="-287338">
               <a:spcBef>
                 <a:spcPts val="600"/>
               </a:spcBef>
+              <a:buFont typeface="Arial" panose="020B0604020202020204" pitchFamily="34" charset="0"/>
+              <a:buChar char="•"/>
             </a:pPr>
             <a:r>
               <a:rPr lang="en-US" sz="3000" dirty="0" smtClean="0"/>
-              <a:t>Cottage Accommodations Page</a:t>
-            </a:r>
-          </a:p>
-          <a:p>
-            <a:pPr lvl="1">
-              <a:lnSpc>
-                <a:spcPct val="120000"/>
-              </a:lnSpc>
+              <a:t>Determine which database tables should be retained or rebuilt</a:t>
+            </a:r>
+          </a:p>
+          <a:p>
+            <a:pPr marL="287338" indent="-287338">
               <a:spcBef>
                 <a:spcPts val="600"/>
               </a:spcBef>
+              <a:buFont typeface="Arial" panose="020B0604020202020204" pitchFamily="34" charset="0"/>
+              <a:buChar char="•"/>
             </a:pPr>
             <a:r>
               <a:rPr lang="en-US" sz="3000" dirty="0" smtClean="0"/>
-              <a:t>Volunteer Hours Log Page with Mobile Capability</a:t>
-            </a:r>
-          </a:p>
-          <a:p>
-            <a:pPr lvl="1">
-              <a:lnSpc>
-                <a:spcPct val="120000"/>
-              </a:lnSpc>
+              <a:t>Recommend adding necessary functionalities such as report generator of volunteer hours, state site link, etc.</a:t>
+            </a:r>
+          </a:p>
+          <a:p>
+            <a:pPr marL="287338" indent="-287338">
               <a:spcBef>
                 <a:spcPts val="600"/>
               </a:spcBef>
+              <a:buFont typeface="Arial" panose="020B0604020202020204" pitchFamily="34" charset="0"/>
+              <a:buChar char="•"/>
             </a:pPr>
             <a:r>
               <a:rPr lang="en-US" sz="3000" dirty="0" smtClean="0"/>
-              <a:t>Volunteer Report Generator Page with Separate Login</a:t>
-            </a:r>
-          </a:p>
-          <a:p>
-            <a:pPr marL="287338" indent="-287338">
-              <a:lnSpc>
-                <a:spcPct val="120000"/>
-              </a:lnSpc>
-              <a:spcBef>
-                <a:spcPts val="600"/>
-              </a:spcBef>
-            </a:pPr>
-            <a:r>
-              <a:rPr lang="en-US" sz="3500" b="1" dirty="0"/>
-              <a:t>Example of User Requirement</a:t>
-            </a:r>
-          </a:p>
-          <a:p>
-            <a:pPr marL="804863" lvl="1" indent="-347663">
-              <a:lnSpc>
-                <a:spcPct val="120000"/>
-              </a:lnSpc>
-              <a:spcBef>
-                <a:spcPts val="600"/>
-              </a:spcBef>
-              <a:buFont typeface="Calibri" panose="020F0502020204030204" pitchFamily="34" charset="0"/>
-              <a:buChar char="−"/>
-            </a:pPr>
-            <a:r>
-              <a:rPr lang="en-US" sz="3000" dirty="0"/>
-              <a:t>Smithgall Woods application </a:t>
-            </a:r>
-            <a:r>
-              <a:rPr lang="en-US" sz="3000" u="sng" dirty="0"/>
-              <a:t>shall</a:t>
-            </a:r>
-            <a:r>
-              <a:rPr lang="en-US" sz="3000" dirty="0"/>
-              <a:t> generate volunteer reports showing the number of </a:t>
-            </a:r>
-            <a:r>
-              <a:rPr lang="en-US" sz="3000" dirty="0" smtClean="0"/>
-              <a:t>volunteer hours</a:t>
-            </a:r>
-          </a:p>
-          <a:p>
-            <a:pPr lvl="0">
-              <a:lnSpc>
-                <a:spcPct val="120000"/>
-              </a:lnSpc>
-              <a:spcBef>
-                <a:spcPts val="600"/>
-              </a:spcBef>
-            </a:pPr>
-            <a:r>
-              <a:rPr lang="en-US" b="1" dirty="0" smtClean="0">
-                <a:solidFill>
-                  <a:srgbClr val="FF0000"/>
-                </a:solidFill>
-              </a:rPr>
-              <a:t>Due by Monday, Sep 18</a:t>
-            </a:r>
-            <a:r>
-              <a:rPr lang="en-US" b="1" baseline="30000" dirty="0" smtClean="0">
-                <a:solidFill>
-                  <a:srgbClr val="FF0000"/>
-                </a:solidFill>
-              </a:rPr>
-              <a:t>th</a:t>
-            </a:r>
-            <a:endParaRPr lang="en-US" b="1" dirty="0" smtClean="0">
-              <a:solidFill>
-                <a:srgbClr val="FF0000"/>
-              </a:solidFill>
-            </a:endParaRPr>
+              <a:t>Recommend redesigning site for optimized UX/UI</a:t>
+            </a:r>
           </a:p>
         </p:txBody>
       </p:sp>
     </p:spTree>
     <p:extLst>
       <p:ext uri="{BB962C8B-B14F-4D97-AF65-F5344CB8AC3E}">
-        <p14:creationId xmlns:p14="http://schemas.microsoft.com/office/powerpoint/2010/main" val="2566030765"/>
+        <p14:creationId xmlns:p14="http://schemas.microsoft.com/office/powerpoint/2010/main" val="350524939"/>
       </p:ext>
     </p:extLst>
   </p:cSld>
@@ -4609,6 +4371,285 @@
       <p:sp>
         <p:nvSpPr>
           <p:cNvPr id="2" name="Title 1"/>
+          <p:cNvSpPr>
+            <a:spLocks noGrp="1"/>
+          </p:cNvSpPr>
+          <p:nvPr>
+            <p:ph type="title"/>
+          </p:nvPr>
+        </p:nvSpPr>
+        <p:spPr>
+          <a:xfrm>
+            <a:off x="457200" y="152400"/>
+            <a:ext cx="8229600" cy="838200"/>
+          </a:xfrm>
+        </p:spPr>
+        <p:txBody>
+          <a:bodyPr/>
+          <a:lstStyle/>
+          <a:p>
+            <a:pPr marL="223837" marR="0" lvl="1" indent="0" algn="ctr" defTabSz="914400" rtl="0" eaLnBrk="1" fontAlgn="auto" latinLnBrk="0" hangingPunct="1">
+              <a:lnSpc>
+                <a:spcPct val="100000"/>
+              </a:lnSpc>
+              <a:spcBef>
+                <a:spcPts val="600"/>
+              </a:spcBef>
+              <a:spcAft>
+                <a:spcPts val="0"/>
+              </a:spcAft>
+              <a:tabLst/>
+              <a:defRPr/>
+            </a:pPr>
+            <a:r>
+              <a:rPr kumimoji="0" lang="en-US" sz="4800" b="1" i="0" u="none" strike="noStrike" kern="1200" cap="none" spc="0" normalizeH="0" baseline="0" noProof="0" dirty="0" smtClean="0">
+                <a:ln>
+                  <a:noFill/>
+                </a:ln>
+                <a:solidFill>
+                  <a:prstClr val="black"/>
+                </a:solidFill>
+                <a:effectLst/>
+                <a:uLnTx/>
+                <a:uFillTx/>
+                <a:latin typeface="Calibri"/>
+                <a:ea typeface="+mn-ea"/>
+                <a:cs typeface="+mn-cs"/>
+              </a:rPr>
+              <a:t>User Requirements</a:t>
+            </a:r>
+            <a:endParaRPr lang="en-US" dirty="0"/>
+          </a:p>
+        </p:txBody>
+      </p:sp>
+      <p:sp>
+        <p:nvSpPr>
+          <p:cNvPr id="3" name="Content Placeholder 2"/>
+          <p:cNvSpPr>
+            <a:spLocks noGrp="1"/>
+          </p:cNvSpPr>
+          <p:nvPr>
+            <p:ph idx="1"/>
+          </p:nvPr>
+        </p:nvSpPr>
+        <p:spPr>
+          <a:xfrm>
+            <a:off x="457200" y="990600"/>
+            <a:ext cx="8229600" cy="5867400"/>
+          </a:xfrm>
+        </p:spPr>
+        <p:txBody>
+          <a:bodyPr>
+            <a:normAutofit fontScale="85000" lnSpcReduction="20000"/>
+          </a:bodyPr>
+          <a:lstStyle/>
+          <a:p>
+            <a:pPr>
+              <a:lnSpc>
+                <a:spcPct val="120000"/>
+              </a:lnSpc>
+              <a:spcBef>
+                <a:spcPts val="600"/>
+              </a:spcBef>
+            </a:pPr>
+            <a:r>
+              <a:rPr lang="en-US" sz="3500" dirty="0"/>
+              <a:t>Gather potential user requirements from team </a:t>
+            </a:r>
+            <a:r>
+              <a:rPr lang="en-US" sz="3500" dirty="0" smtClean="0"/>
+              <a:t>members</a:t>
+            </a:r>
+          </a:p>
+          <a:p>
+            <a:pPr lvl="1">
+              <a:lnSpc>
+                <a:spcPct val="120000"/>
+              </a:lnSpc>
+              <a:spcBef>
+                <a:spcPts val="600"/>
+              </a:spcBef>
+            </a:pPr>
+            <a:r>
+              <a:rPr lang="en-US" sz="3000" dirty="0" smtClean="0"/>
+              <a:t>Website Pages (Home, About Us, Activities, Volunteer Opportunities, Contact Us, and Friends Chapter)</a:t>
+            </a:r>
+          </a:p>
+          <a:p>
+            <a:pPr lvl="1">
+              <a:lnSpc>
+                <a:spcPct val="120000"/>
+              </a:lnSpc>
+              <a:spcBef>
+                <a:spcPts val="600"/>
+              </a:spcBef>
+            </a:pPr>
+            <a:r>
+              <a:rPr lang="en-US" sz="3000" dirty="0"/>
+              <a:t>Become a Friend or </a:t>
+            </a:r>
+            <a:r>
+              <a:rPr lang="en-US" sz="3000" dirty="0" smtClean="0"/>
+              <a:t>Volunteer Page</a:t>
+            </a:r>
+          </a:p>
+          <a:p>
+            <a:pPr lvl="1">
+              <a:lnSpc>
+                <a:spcPct val="120000"/>
+              </a:lnSpc>
+              <a:spcBef>
+                <a:spcPts val="600"/>
+              </a:spcBef>
+            </a:pPr>
+            <a:r>
+              <a:rPr lang="en-US" sz="3000" dirty="0" smtClean="0"/>
+              <a:t>Cottage Accommodations Page</a:t>
+            </a:r>
+          </a:p>
+          <a:p>
+            <a:pPr lvl="1">
+              <a:lnSpc>
+                <a:spcPct val="120000"/>
+              </a:lnSpc>
+              <a:spcBef>
+                <a:spcPts val="600"/>
+              </a:spcBef>
+            </a:pPr>
+            <a:r>
+              <a:rPr lang="en-US" sz="3000" dirty="0" smtClean="0"/>
+              <a:t>Volunteer Hours Log Page with Mobile Capability</a:t>
+            </a:r>
+          </a:p>
+          <a:p>
+            <a:pPr lvl="1">
+              <a:lnSpc>
+                <a:spcPct val="120000"/>
+              </a:lnSpc>
+              <a:spcBef>
+                <a:spcPts val="600"/>
+              </a:spcBef>
+            </a:pPr>
+            <a:r>
+              <a:rPr lang="en-US" sz="3000" dirty="0" smtClean="0"/>
+              <a:t>Volunteer Report Generator Page with Separate Login</a:t>
+            </a:r>
+          </a:p>
+          <a:p>
+            <a:pPr marL="287338" indent="-287338">
+              <a:lnSpc>
+                <a:spcPct val="120000"/>
+              </a:lnSpc>
+              <a:spcBef>
+                <a:spcPts val="600"/>
+              </a:spcBef>
+            </a:pPr>
+            <a:r>
+              <a:rPr lang="en-US" sz="3500" b="1" dirty="0"/>
+              <a:t>Example of User Requirement</a:t>
+            </a:r>
+          </a:p>
+          <a:p>
+            <a:pPr marL="804863" lvl="1" indent="-347663">
+              <a:lnSpc>
+                <a:spcPct val="120000"/>
+              </a:lnSpc>
+              <a:spcBef>
+                <a:spcPts val="600"/>
+              </a:spcBef>
+              <a:buFont typeface="Calibri" panose="020F0502020204030204" pitchFamily="34" charset="0"/>
+              <a:buChar char="−"/>
+            </a:pPr>
+            <a:r>
+              <a:rPr lang="en-US" sz="3000" dirty="0"/>
+              <a:t>Smithgall Woods application </a:t>
+            </a:r>
+            <a:r>
+              <a:rPr lang="en-US" sz="3000" u="sng" dirty="0"/>
+              <a:t>shall</a:t>
+            </a:r>
+            <a:r>
+              <a:rPr lang="en-US" sz="3000" dirty="0"/>
+              <a:t> generate volunteer reports showing the number of </a:t>
+            </a:r>
+            <a:r>
+              <a:rPr lang="en-US" sz="3000" dirty="0" smtClean="0"/>
+              <a:t>volunteer hours</a:t>
+            </a:r>
+          </a:p>
+          <a:p>
+            <a:pPr lvl="0">
+              <a:lnSpc>
+                <a:spcPct val="120000"/>
+              </a:lnSpc>
+              <a:spcBef>
+                <a:spcPts val="600"/>
+              </a:spcBef>
+            </a:pPr>
+            <a:r>
+              <a:rPr lang="en-US" b="1" dirty="0" smtClean="0">
+                <a:solidFill>
+                  <a:srgbClr val="FF0000"/>
+                </a:solidFill>
+              </a:rPr>
+              <a:t>Due by Monday, Sep 18</a:t>
+            </a:r>
+            <a:r>
+              <a:rPr lang="en-US" b="1" baseline="30000" dirty="0" smtClean="0">
+                <a:solidFill>
+                  <a:srgbClr val="FF0000"/>
+                </a:solidFill>
+              </a:rPr>
+              <a:t>th</a:t>
+            </a:r>
+            <a:endParaRPr lang="en-US" b="1" dirty="0" smtClean="0">
+              <a:solidFill>
+                <a:srgbClr val="FF0000"/>
+              </a:solidFill>
+            </a:endParaRPr>
+          </a:p>
+        </p:txBody>
+      </p:sp>
+    </p:spTree>
+    <p:extLst>
+      <p:ext uri="{BB962C8B-B14F-4D97-AF65-F5344CB8AC3E}">
+        <p14:creationId xmlns:p14="http://schemas.microsoft.com/office/powerpoint/2010/main" val="2566030765"/>
+      </p:ext>
+    </p:extLst>
+  </p:cSld>
+  <p:clrMapOvr>
+    <a:masterClrMapping/>
+  </p:clrMapOvr>
+  <p:timing>
+    <p:tnLst>
+      <p:par>
+        <p:cTn id="1" dur="indefinite" restart="never" nodeType="tmRoot"/>
+      </p:par>
+    </p:tnLst>
+  </p:timing>
+</p:sld>
+</file>
+
+<file path=ppt/slides/slide6.xml><?xml version="1.0" encoding="utf-8"?>
+<p:sld xmlns:a="http://schemas.openxmlformats.org/drawingml/2006/main" xmlns:r="http://schemas.openxmlformats.org/officeDocument/2006/relationships" xmlns:p="http://schemas.openxmlformats.org/presentationml/2006/main">
+  <p:cSld>
+    <p:spTree>
+      <p:nvGrpSpPr>
+        <p:cNvPr id="1" name=""/>
+        <p:cNvGrpSpPr/>
+        <p:nvPr/>
+      </p:nvGrpSpPr>
+      <p:grpSpPr>
+        <a:xfrm>
+          <a:off x="0" y="0"/>
+          <a:ext cx="0" cy="0"/>
+          <a:chOff x="0" y="0"/>
+          <a:chExt cx="0" cy="0"/>
+        </a:xfrm>
+      </p:grpSpPr>
+      <p:sp>
+        <p:nvSpPr>
+          <p:cNvPr id="2" name="Title 1"/>
           <p:cNvSpPr txBox="1">
             <a:spLocks/>
           </p:cNvSpPr>
@@ -4809,7 +4850,7 @@
 </p:sld>
 </file>
 
-<file path=ppt/slides/slide6.xml><?xml version="1.0" encoding="utf-8"?>
+<file path=ppt/slides/slide7.xml><?xml version="1.0" encoding="utf-8"?>
 <p:sld xmlns:a="http://schemas.openxmlformats.org/drawingml/2006/main" xmlns:r="http://schemas.openxmlformats.org/officeDocument/2006/relationships" xmlns:p="http://schemas.openxmlformats.org/presentationml/2006/main">
   <p:cSld>
     <p:spTree>
@@ -5000,231 +5041,6 @@
 </p:sld>
 </file>
 
-<file path=ppt/slides/slide7.xml><?xml version="1.0" encoding="utf-8"?>
-<p:sld xmlns:a="http://schemas.openxmlformats.org/drawingml/2006/main" xmlns:r="http://schemas.openxmlformats.org/officeDocument/2006/relationships" xmlns:p="http://schemas.openxmlformats.org/presentationml/2006/main">
-  <p:cSld>
-    <p:spTree>
-      <p:nvGrpSpPr>
-        <p:cNvPr id="1" name=""/>
-        <p:cNvGrpSpPr/>
-        <p:nvPr/>
-      </p:nvGrpSpPr>
-      <p:grpSpPr>
-        <a:xfrm>
-          <a:off x="0" y="0"/>
-          <a:ext cx="0" cy="0"/>
-          <a:chOff x="0" y="0"/>
-          <a:chExt cx="0" cy="0"/>
-        </a:xfrm>
-      </p:grpSpPr>
-      <p:sp>
-        <p:nvSpPr>
-          <p:cNvPr id="2" name="Title 1"/>
-          <p:cNvSpPr txBox="1">
-            <a:spLocks/>
-          </p:cNvSpPr>
-          <p:nvPr/>
-        </p:nvSpPr>
-        <p:spPr>
-          <a:xfrm>
-            <a:off x="838200" y="274638"/>
-            <a:ext cx="7391400" cy="1143000"/>
-          </a:xfrm>
-          <a:prstGeom prst="rect">
-            <a:avLst/>
-          </a:prstGeom>
-        </p:spPr>
-        <p:txBody>
-          <a:bodyPr vert="horz" lIns="91440" tIns="45720" rIns="91440" bIns="45720" rtlCol="0" anchor="ctr">
-            <a:noAutofit/>
-          </a:bodyPr>
-          <a:lstStyle>
-            <a:lvl1pPr algn="ctr" defTabSz="914400" rtl="0" eaLnBrk="1" latinLnBrk="0" hangingPunct="1">
-              <a:spcBef>
-                <a:spcPct val="0"/>
-              </a:spcBef>
-              <a:buNone/>
-              <a:defRPr sz="4400" kern="1200">
-                <a:solidFill>
-                  <a:schemeClr val="tx1"/>
-                </a:solidFill>
-                <a:latin typeface="+mj-lt"/>
-                <a:ea typeface="+mj-ea"/>
-                <a:cs typeface="+mj-cs"/>
-              </a:defRPr>
-            </a:lvl1pPr>
-          </a:lstStyle>
-          <a:p>
-            <a:pPr marL="223837" lvl="1" algn="ctr">
-              <a:spcBef>
-                <a:spcPts val="600"/>
-              </a:spcBef>
-            </a:pPr>
-            <a:r>
-              <a:rPr lang="en-US" sz="4800" b="1" dirty="0" smtClean="0"/>
-              <a:t>Development </a:t>
-            </a:r>
-            <a:r>
-              <a:rPr lang="en-US" sz="4800" b="1" dirty="0"/>
-              <a:t>Approach</a:t>
-            </a:r>
-          </a:p>
-        </p:txBody>
-      </p:sp>
-      <p:sp>
-        <p:nvSpPr>
-          <p:cNvPr id="3" name="TextBox 2"/>
-          <p:cNvSpPr txBox="1"/>
-          <p:nvPr/>
-        </p:nvSpPr>
-        <p:spPr>
-          <a:xfrm>
-            <a:off x="609600" y="1600200"/>
-            <a:ext cx="8001000" cy="4308872"/>
-          </a:xfrm>
-          <a:prstGeom prst="rect">
-            <a:avLst/>
-          </a:prstGeom>
-          <a:noFill/>
-        </p:spPr>
-        <p:txBody>
-          <a:bodyPr wrap="square" rtlCol="0">
-            <a:spAutoFit/>
-          </a:bodyPr>
-          <a:lstStyle/>
-          <a:p>
-            <a:pPr marL="287338" indent="-287338">
-              <a:spcBef>
-                <a:spcPts val="600"/>
-              </a:spcBef>
-              <a:buFont typeface="Arial" panose="020B0604020202020204" pitchFamily="34" charset="0"/>
-              <a:buChar char="•"/>
-            </a:pPr>
-            <a:r>
-              <a:rPr lang="en-US" sz="3600" dirty="0" smtClean="0"/>
-              <a:t>Use Incremental </a:t>
-            </a:r>
-            <a:r>
-              <a:rPr lang="en-US" sz="3600" dirty="0" smtClean="0"/>
-              <a:t>Approach</a:t>
-            </a:r>
-          </a:p>
-          <a:p>
-            <a:pPr marL="287338" indent="-287338">
-              <a:spcBef>
-                <a:spcPts val="600"/>
-              </a:spcBef>
-              <a:buFont typeface="Arial" panose="020B0604020202020204" pitchFamily="34" charset="0"/>
-              <a:buChar char="•"/>
-            </a:pPr>
-            <a:r>
-              <a:rPr lang="en-US" sz="3600" dirty="0" smtClean="0"/>
-              <a:t>Learn using WordPress &amp; PHP</a:t>
-            </a:r>
-            <a:endParaRPr lang="en-US" sz="3600" dirty="0" smtClean="0"/>
-          </a:p>
-          <a:p>
-            <a:pPr marL="287338" indent="-287338">
-              <a:spcBef>
-                <a:spcPts val="600"/>
-              </a:spcBef>
-              <a:buFont typeface="Arial" panose="020B0604020202020204" pitchFamily="34" charset="0"/>
-              <a:buChar char="•"/>
-            </a:pPr>
-            <a:r>
-              <a:rPr lang="en-US" sz="3600" dirty="0" smtClean="0"/>
-              <a:t>Use single type IDE/Code Editor (Eclipse)</a:t>
-            </a:r>
-            <a:endParaRPr lang="en-US" sz="3600" dirty="0" smtClean="0"/>
-          </a:p>
-          <a:p>
-            <a:pPr marL="287338" indent="-287338">
-              <a:spcBef>
-                <a:spcPts val="600"/>
-              </a:spcBef>
-              <a:buFont typeface="Arial" panose="020B0604020202020204" pitchFamily="34" charset="0"/>
-              <a:buChar char="•"/>
-            </a:pPr>
-            <a:r>
-              <a:rPr lang="en-US" sz="3600" dirty="0" smtClean="0"/>
-              <a:t>Use Java and JavaScript </a:t>
-            </a:r>
-            <a:r>
-              <a:rPr lang="en-US" sz="3600" dirty="0" smtClean="0"/>
-              <a:t>Libraries</a:t>
-            </a:r>
-          </a:p>
-          <a:p>
-            <a:pPr marL="804863" lvl="1" indent="-347663">
-              <a:spcBef>
-                <a:spcPts val="600"/>
-              </a:spcBef>
-              <a:buFont typeface="Calibri" panose="020F0502020204030204" pitchFamily="34" charset="0"/>
-              <a:buChar char="−"/>
-            </a:pPr>
-            <a:r>
-              <a:rPr lang="en-US" sz="3200" dirty="0" smtClean="0"/>
-              <a:t>Simplify rebuild of the website</a:t>
-            </a:r>
-          </a:p>
-          <a:p>
-            <a:pPr marL="804863" lvl="1" indent="-347663">
-              <a:spcBef>
-                <a:spcPts val="600"/>
-              </a:spcBef>
-              <a:buFont typeface="Calibri" panose="020F0502020204030204" pitchFamily="34" charset="0"/>
-              <a:buChar char="−"/>
-            </a:pPr>
-            <a:r>
-              <a:rPr lang="en-US" sz="3200" dirty="0" smtClean="0"/>
-              <a:t>Avoid reinventing the wheel</a:t>
-            </a:r>
-            <a:endParaRPr lang="en-US" sz="3200" dirty="0" smtClean="0"/>
-          </a:p>
-          <a:p>
-            <a:pPr marL="287338" indent="-287338">
-              <a:spcBef>
-                <a:spcPts val="600"/>
-              </a:spcBef>
-              <a:buFont typeface="Arial" panose="020B0604020202020204" pitchFamily="34" charset="0"/>
-              <a:buChar char="•"/>
-            </a:pPr>
-            <a:r>
-              <a:rPr lang="en-US" sz="3600" dirty="0" smtClean="0"/>
-              <a:t>Build </a:t>
-            </a:r>
-            <a:r>
-              <a:rPr lang="en-US" sz="3600" dirty="0" smtClean="0"/>
-              <a:t>a simple </a:t>
-            </a:r>
-            <a:r>
-              <a:rPr lang="en-US" sz="3600" dirty="0" smtClean="0"/>
-              <a:t>prototype of the website</a:t>
-            </a:r>
-            <a:endParaRPr lang="en-US" sz="3600" dirty="0"/>
-          </a:p>
-        </p:txBody>
-      </p:sp>
-    </p:spTree>
-    <p:extLst>
-      <p:ext uri="{BB962C8B-B14F-4D97-AF65-F5344CB8AC3E}">
-        <p14:creationId xmlns:p14="http://schemas.microsoft.com/office/powerpoint/2010/main" val="1319905176"/>
-      </p:ext>
-    </p:extLst>
-  </p:cSld>
-  <p:clrMapOvr>
-    <a:masterClrMapping/>
-  </p:clrMapOvr>
-  <p:timing>
-    <p:tnLst>
-      <p:par>
-        <p:cTn id="1" dur="indefinite" restart="never" nodeType="tmRoot"/>
-      </p:par>
-    </p:tnLst>
-  </p:timing>
-</p:sld>
-</file>
-
 <file path=ppt/slides/slide8.xml><?xml version="1.0" encoding="utf-8"?>
 <p:sld xmlns:a="http://schemas.openxmlformats.org/drawingml/2006/main" xmlns:r="http://schemas.openxmlformats.org/officeDocument/2006/relationships" xmlns:p="http://schemas.openxmlformats.org/presentationml/2006/main">
   <p:cSld>
@@ -5287,9 +5103,12 @@
             </a:pPr>
             <a:r>
               <a:rPr lang="en-US" sz="4800" b="1" dirty="0" smtClean="0"/>
-              <a:t>Challenges</a:t>
-            </a:r>
-            <a:endParaRPr lang="en-US" sz="4800" b="1" dirty="0"/>
+              <a:t>Development </a:t>
+            </a:r>
+            <a:r>
+              <a:rPr lang="en-US" sz="4800" b="1" dirty="0"/>
+              <a:t>Approach</a:t>
+            </a:r>
           </a:p>
         </p:txBody>
       </p:sp>
@@ -5301,8 +5120,8 @@
         </p:nvSpPr>
         <p:spPr>
           <a:xfrm>
-            <a:off x="609600" y="1750874"/>
-            <a:ext cx="7772400" cy="1831271"/>
+            <a:off x="609600" y="1600200"/>
+            <a:ext cx="8001000" cy="4308872"/>
           </a:xfrm>
           <a:prstGeom prst="rect">
             <a:avLst/>
@@ -5324,7 +5143,7 @@
             </a:pPr>
             <a:r>
               <a:rPr lang="en-US" sz="3600" dirty="0" smtClean="0"/>
-              <a:t>Start making notes of challenges you come across</a:t>
+              <a:t>Use Incremental Approach</a:t>
             </a:r>
           </a:p>
           <a:p>
@@ -5337,7 +5156,72 @@
             </a:pPr>
             <a:r>
               <a:rPr lang="en-US" sz="3600" dirty="0" smtClean="0"/>
-              <a:t>Briefly describe applied solution</a:t>
+              <a:t>Learn using WordPress &amp; PHP</a:t>
+            </a:r>
+          </a:p>
+          <a:p>
+            <a:pPr marL="287338" indent="-287338">
+              <a:spcBef>
+                <a:spcPts val="600"/>
+              </a:spcBef>
+              <a:buFont typeface="Arial" panose="020B0604020202020204" pitchFamily="34" charset="0"/>
+              <a:buChar char="•"/>
+            </a:pPr>
+            <a:r>
+              <a:rPr lang="en-US" sz="3600" dirty="0" smtClean="0"/>
+              <a:t>Use single type IDE/Code Editor (Eclipse)</a:t>
+            </a:r>
+          </a:p>
+          <a:p>
+            <a:pPr marL="287338" indent="-287338">
+              <a:spcBef>
+                <a:spcPts val="600"/>
+              </a:spcBef>
+              <a:buFont typeface="Arial" panose="020B0604020202020204" pitchFamily="34" charset="0"/>
+              <a:buChar char="•"/>
+            </a:pPr>
+            <a:r>
+              <a:rPr lang="en-US" sz="3600" dirty="0" smtClean="0"/>
+              <a:t>Use Java and JavaScript Libraries</a:t>
+            </a:r>
+          </a:p>
+          <a:p>
+            <a:pPr marL="804863" lvl="1" indent="-347663">
+              <a:spcBef>
+                <a:spcPts val="600"/>
+              </a:spcBef>
+              <a:buFont typeface="Calibri" panose="020F0502020204030204" pitchFamily="34" charset="0"/>
+              <a:buChar char="−"/>
+            </a:pPr>
+            <a:r>
+              <a:rPr lang="en-US" sz="3200" dirty="0" smtClean="0"/>
+              <a:t>Simplify rebuild of the website</a:t>
+            </a:r>
+          </a:p>
+          <a:p>
+            <a:pPr marL="804863" lvl="1" indent="-347663">
+              <a:spcBef>
+                <a:spcPts val="600"/>
+              </a:spcBef>
+              <a:buFont typeface="Calibri" panose="020F0502020204030204" pitchFamily="34" charset="0"/>
+              <a:buChar char="−"/>
+            </a:pPr>
+            <a:r>
+              <a:rPr lang="en-US" sz="3200" dirty="0" smtClean="0"/>
+              <a:t>Avoid reinventing the wheel</a:t>
+            </a:r>
+          </a:p>
+          <a:p>
+            <a:pPr marL="287338" indent="-287338">
+              <a:spcBef>
+                <a:spcPts val="600"/>
+              </a:spcBef>
+              <a:buFont typeface="Arial" panose="020B0604020202020204" pitchFamily="34" charset="0"/>
+              <a:buChar char="•"/>
+            </a:pPr>
+            <a:r>
+              <a:rPr lang="en-US" sz="3600" dirty="0" smtClean="0"/>
+              <a:t>Build a simple prototype of the website</a:t>
             </a:r>
             <a:endParaRPr lang="en-US" sz="3600" dirty="0"/>
           </a:p>
@@ -5346,7 +5230,7 @@
     </p:spTree>
     <p:extLst>
       <p:ext uri="{BB962C8B-B14F-4D97-AF65-F5344CB8AC3E}">
-        <p14:creationId xmlns:p14="http://schemas.microsoft.com/office/powerpoint/2010/main" val="3700945684"/>
+        <p14:creationId xmlns:p14="http://schemas.microsoft.com/office/powerpoint/2010/main" val="1319905176"/>
       </p:ext>
     </p:extLst>
   </p:cSld>
@@ -5382,7 +5266,7 @@
       </p:grpSpPr>
       <p:sp>
         <p:nvSpPr>
-          <p:cNvPr id="4" name="Title 1"/>
+          <p:cNvPr id="2" name="Title 1"/>
           <p:cNvSpPr txBox="1">
             <a:spLocks/>
           </p:cNvSpPr>
@@ -5390,8 +5274,8 @@
         </p:nvSpPr>
         <p:spPr>
           <a:xfrm>
-            <a:off x="457200" y="2667000"/>
-            <a:ext cx="8229600" cy="1143000"/>
+            <a:off x="838200" y="274638"/>
+            <a:ext cx="7391400" cy="1143000"/>
           </a:xfrm>
           <a:prstGeom prst="rect">
             <a:avLst/>
@@ -5399,7 +5283,7 @@
         </p:spPr>
         <p:txBody>
           <a:bodyPr vert="horz" lIns="91440" tIns="45720" rIns="91440" bIns="45720" rtlCol="0" anchor="ctr">
-            <a:normAutofit/>
+            <a:noAutofit/>
           </a:bodyPr>
           <a:lstStyle>
             <a:lvl1pPr algn="ctr" defTabSz="914400" rtl="0" eaLnBrk="1" latinLnBrk="0" hangingPunct="1">
@@ -5418,18 +5302,73 @@
             </a:lvl1pPr>
           </a:lstStyle>
           <a:p>
-            <a:r>
-              <a:rPr lang="en-US" sz="6000" b="1" dirty="0" smtClean="0"/>
-              <a:t>BACKUPS</a:t>
-            </a:r>
-            <a:endParaRPr lang="en-US" sz="6000" b="1" dirty="0"/>
+            <a:pPr marL="223837" lvl="1" algn="ctr">
+              <a:spcBef>
+                <a:spcPts val="600"/>
+              </a:spcBef>
+            </a:pPr>
+            <a:r>
+              <a:rPr lang="en-US" sz="4800" b="1" dirty="0" smtClean="0"/>
+              <a:t>Challenges</a:t>
+            </a:r>
+            <a:endParaRPr lang="en-US" sz="4800" b="1" dirty="0"/>
+          </a:p>
+        </p:txBody>
+      </p:sp>
+      <p:sp>
+        <p:nvSpPr>
+          <p:cNvPr id="3" name="TextBox 2"/>
+          <p:cNvSpPr txBox="1"/>
+          <p:nvPr/>
+        </p:nvSpPr>
+        <p:spPr>
+          <a:xfrm>
+            <a:off x="609600" y="1750874"/>
+            <a:ext cx="7772400" cy="1831271"/>
+          </a:xfrm>
+          <a:prstGeom prst="rect">
+            <a:avLst/>
+          </a:prstGeom>
+          <a:noFill/>
+        </p:spPr>
+        <p:txBody>
+          <a:bodyPr wrap="square" rtlCol="0">
+            <a:spAutoFit/>
+          </a:bodyPr>
+          <a:lstStyle/>
+          <a:p>
+            <a:pPr marL="287338" indent="-287338">
+              <a:spcBef>
+                <a:spcPts val="600"/>
+              </a:spcBef>
+              <a:buFont typeface="Arial" panose="020B0604020202020204" pitchFamily="34" charset="0"/>
+              <a:buChar char="•"/>
+            </a:pPr>
+            <a:r>
+              <a:rPr lang="en-US" sz="3600" dirty="0" smtClean="0"/>
+              <a:t>Start making notes of challenges you come across</a:t>
+            </a:r>
+          </a:p>
+          <a:p>
+            <a:pPr marL="287338" indent="-287338">
+              <a:spcBef>
+                <a:spcPts val="600"/>
+              </a:spcBef>
+              <a:buFont typeface="Arial" panose="020B0604020202020204" pitchFamily="34" charset="0"/>
+              <a:buChar char="•"/>
+            </a:pPr>
+            <a:r>
+              <a:rPr lang="en-US" sz="3600" dirty="0" smtClean="0"/>
+              <a:t>Briefly describe applied solution</a:t>
+            </a:r>
+            <a:endParaRPr lang="en-US" sz="3600" dirty="0"/>
           </a:p>
         </p:txBody>
       </p:sp>
     </p:spTree>
     <p:extLst>
       <p:ext uri="{BB962C8B-B14F-4D97-AF65-F5344CB8AC3E}">
-        <p14:creationId xmlns:p14="http://schemas.microsoft.com/office/powerpoint/2010/main" val="763363549"/>
+        <p14:creationId xmlns:p14="http://schemas.microsoft.com/office/powerpoint/2010/main" val="3700945684"/>
       </p:ext>
     </p:extLst>
   </p:cSld>

</xml_diff>